<commit_message>
added initial ArrayExplorer dialog
</commit_message>
<xml_diff>
--- a/resources/icons.pptx
+++ b/resources/icons.pptx
@@ -5,10 +5,12 @@
     <p:sldMasterId id="2147483672" r:id="rId1"/>
   </p:sldMasterIdLst>
   <p:notesMasterIdLst>
-    <p:notesMasterId r:id="rId3"/>
+    <p:notesMasterId r:id="rId5"/>
   </p:notesMasterIdLst>
   <p:sldIdLst>
     <p:sldId id="318" r:id="rId2"/>
+    <p:sldId id="388" r:id="rId3"/>
+    <p:sldId id="574" r:id="rId4"/>
   </p:sldIdLst>
   <p:sldSz cx="5486400" cy="5486400"/>
   <p:notesSz cx="6858000" cy="9144000"/>
@@ -197,7 +199,7 @@
           <a:p>
             <a:fld id="{173FD435-C119-4590-9D53-7CAF83F19020}" type="datetimeFigureOut">
               <a:rPr lang="en-US" smtClean="0"/>
-              <a:t>11/19/2018</a:t>
+              <a:t>11/25/2018</a:t>
             </a:fld>
             <a:endParaRPr lang="en-US"/>
           </a:p>
@@ -679,7 +681,7 @@
           <a:p>
             <a:fld id="{D296FE55-24A0-4405-87BA-F203EB2AA989}" type="datetimeFigureOut">
               <a:rPr lang="en-US" smtClean="0"/>
-              <a:t>11/19/2018</a:t>
+              <a:t>11/25/2018</a:t>
             </a:fld>
             <a:endParaRPr lang="en-US"/>
           </a:p>
@@ -849,7 +851,7 @@
           <a:p>
             <a:fld id="{D296FE55-24A0-4405-87BA-F203EB2AA989}" type="datetimeFigureOut">
               <a:rPr lang="en-US" smtClean="0"/>
-              <a:t>11/19/2018</a:t>
+              <a:t>11/25/2018</a:t>
             </a:fld>
             <a:endParaRPr lang="en-US"/>
           </a:p>
@@ -1029,7 +1031,7 @@
           <a:p>
             <a:fld id="{D296FE55-24A0-4405-87BA-F203EB2AA989}" type="datetimeFigureOut">
               <a:rPr lang="en-US" smtClean="0"/>
-              <a:t>11/19/2018</a:t>
+              <a:t>11/25/2018</a:t>
             </a:fld>
             <a:endParaRPr lang="en-US"/>
           </a:p>
@@ -1199,7 +1201,7 @@
           <a:p>
             <a:fld id="{D296FE55-24A0-4405-87BA-F203EB2AA989}" type="datetimeFigureOut">
               <a:rPr lang="en-US" smtClean="0"/>
-              <a:t>11/19/2018</a:t>
+              <a:t>11/25/2018</a:t>
             </a:fld>
             <a:endParaRPr lang="en-US"/>
           </a:p>
@@ -1443,7 +1445,7 @@
           <a:p>
             <a:fld id="{D296FE55-24A0-4405-87BA-F203EB2AA989}" type="datetimeFigureOut">
               <a:rPr lang="en-US" smtClean="0"/>
-              <a:t>11/19/2018</a:t>
+              <a:t>11/25/2018</a:t>
             </a:fld>
             <a:endParaRPr lang="en-US"/>
           </a:p>
@@ -1675,7 +1677,7 @@
           <a:p>
             <a:fld id="{D296FE55-24A0-4405-87BA-F203EB2AA989}" type="datetimeFigureOut">
               <a:rPr lang="en-US" smtClean="0"/>
-              <a:t>11/19/2018</a:t>
+              <a:t>11/25/2018</a:t>
             </a:fld>
             <a:endParaRPr lang="en-US"/>
           </a:p>
@@ -2042,7 +2044,7 @@
           <a:p>
             <a:fld id="{D296FE55-24A0-4405-87BA-F203EB2AA989}" type="datetimeFigureOut">
               <a:rPr lang="en-US" smtClean="0"/>
-              <a:t>11/19/2018</a:t>
+              <a:t>11/25/2018</a:t>
             </a:fld>
             <a:endParaRPr lang="en-US"/>
           </a:p>
@@ -2160,7 +2162,7 @@
           <a:p>
             <a:fld id="{D296FE55-24A0-4405-87BA-F203EB2AA989}" type="datetimeFigureOut">
               <a:rPr lang="en-US" smtClean="0"/>
-              <a:t>11/19/2018</a:t>
+              <a:t>11/25/2018</a:t>
             </a:fld>
             <a:endParaRPr lang="en-US"/>
           </a:p>
@@ -2255,7 +2257,7 @@
           <a:p>
             <a:fld id="{D296FE55-24A0-4405-87BA-F203EB2AA989}" type="datetimeFigureOut">
               <a:rPr lang="en-US" smtClean="0"/>
-              <a:t>11/19/2018</a:t>
+              <a:t>11/25/2018</a:t>
             </a:fld>
             <a:endParaRPr lang="en-US"/>
           </a:p>
@@ -2532,7 +2534,7 @@
           <a:p>
             <a:fld id="{D296FE55-24A0-4405-87BA-F203EB2AA989}" type="datetimeFigureOut">
               <a:rPr lang="en-US" smtClean="0"/>
-              <a:t>11/19/2018</a:t>
+              <a:t>11/25/2018</a:t>
             </a:fld>
             <a:endParaRPr lang="en-US"/>
           </a:p>
@@ -2789,7 +2791,7 @@
           <a:p>
             <a:fld id="{D296FE55-24A0-4405-87BA-F203EB2AA989}" type="datetimeFigureOut">
               <a:rPr lang="en-US" smtClean="0"/>
-              <a:t>11/19/2018</a:t>
+              <a:t>11/25/2018</a:t>
             </a:fld>
             <a:endParaRPr lang="en-US"/>
           </a:p>
@@ -3002,7 +3004,7 @@
           <a:p>
             <a:fld id="{D296FE55-24A0-4405-87BA-F203EB2AA989}" type="datetimeFigureOut">
               <a:rPr lang="en-US" smtClean="0"/>
-              <a:t>11/19/2018</a:t>
+              <a:t>11/25/2018</a:t>
             </a:fld>
             <a:endParaRPr lang="en-US"/>
           </a:p>
@@ -3708,6 +3710,239 @@
     <p:extLst>
       <p:ext uri="{BB962C8B-B14F-4D97-AF65-F5344CB8AC3E}">
         <p14:creationId xmlns:p14="http://schemas.microsoft.com/office/powerpoint/2010/main" val="2127505850"/>
+      </p:ext>
+    </p:extLst>
+  </p:cSld>
+  <p:clrMapOvr>
+    <a:masterClrMapping/>
+  </p:clrMapOvr>
+</p:sld>
+</file>
+
+<file path=ppt/slides/slide2.xml><?xml version="1.0" encoding="utf-8"?>
+<p:sld xmlns:a="http://schemas.openxmlformats.org/drawingml/2006/main" xmlns:r="http://schemas.openxmlformats.org/officeDocument/2006/relationships" xmlns:p="http://schemas.openxmlformats.org/presentationml/2006/main">
+  <p:cSld>
+    <p:spTree>
+      <p:nvGrpSpPr>
+        <p:cNvPr id="1" name=""/>
+        <p:cNvGrpSpPr/>
+        <p:nvPr/>
+      </p:nvGrpSpPr>
+      <p:grpSpPr>
+        <a:xfrm>
+          <a:off x="0" y="0"/>
+          <a:ext cx="0" cy="0"/>
+          <a:chOff x="0" y="0"/>
+          <a:chExt cx="0" cy="0"/>
+        </a:xfrm>
+      </p:grpSpPr>
+      <p:sp>
+        <p:nvSpPr>
+          <p:cNvPr id="4" name="Oval 3"/>
+          <p:cNvSpPr/>
+          <p:nvPr/>
+        </p:nvSpPr>
+        <p:spPr>
+          <a:xfrm>
+            <a:off x="603504" y="603504"/>
+            <a:ext cx="4279392" cy="4279392"/>
+          </a:xfrm>
+          <a:prstGeom prst="ellipse">
+            <a:avLst/>
+          </a:prstGeom>
+          <a:solidFill>
+            <a:schemeClr val="bg1">
+              <a:lumMod val="95000"/>
+            </a:schemeClr>
+          </a:solidFill>
+          <a:ln>
+            <a:noFill/>
+          </a:ln>
+          <a:effectLst>
+            <a:outerShdw dist="38100" dir="2700000" algn="tl" rotWithShape="0">
+              <a:prstClr val="black">
+                <a:alpha val="40000"/>
+              </a:prstClr>
+            </a:outerShdw>
+          </a:effectLst>
+          <a:scene3d>
+            <a:camera prst="orthographicFront"/>
+            <a:lightRig rig="harsh" dir="t"/>
+          </a:scene3d>
+          <a:sp3d>
+            <a:bevelT w="152400" h="50800" prst="softRound"/>
+          </a:sp3d>
+        </p:spPr>
+        <p:style>
+          <a:lnRef idx="2">
+            <a:schemeClr val="accent1">
+              <a:shade val="50000"/>
+            </a:schemeClr>
+          </a:lnRef>
+          <a:fillRef idx="1">
+            <a:schemeClr val="accent1"/>
+          </a:fillRef>
+          <a:effectRef idx="0">
+            <a:schemeClr val="accent1"/>
+          </a:effectRef>
+          <a:fontRef idx="minor">
+            <a:schemeClr val="lt1"/>
+          </a:fontRef>
+        </p:style>
+        <p:txBody>
+          <a:bodyPr rtlCol="0" anchor="ctr">
+            <a:sp3d extrusionH="57150" prstMaterial="matte">
+              <a:bevelT w="63500" h="12700" prst="coolSlant"/>
+              <a:contourClr>
+                <a:schemeClr val="bg1">
+                  <a:lumMod val="65000"/>
+                </a:schemeClr>
+              </a:contourClr>
+            </a:sp3d>
+          </a:bodyPr>
+          <a:lstStyle/>
+          <a:p>
+            <a:pPr algn="ctr"/>
+            <a:r>
+              <a:rPr lang="en-US" sz="32400" b="1" dirty="0" err="1">
+                <a:ln/>
+                <a:solidFill>
+                  <a:schemeClr val="accent1">
+                    <a:lumMod val="75000"/>
+                  </a:schemeClr>
+                </a:solidFill>
+                <a:latin typeface="Footlight MT Light" panose="0204060206030A020304" pitchFamily="18" charset="0"/>
+              </a:rPr>
+              <a:t>i</a:t>
+            </a:r>
+            <a:endParaRPr lang="en-US" sz="32400" b="1" dirty="0">
+              <a:ln/>
+              <a:solidFill>
+                <a:schemeClr val="accent1">
+                  <a:lumMod val="75000"/>
+                </a:schemeClr>
+              </a:solidFill>
+              <a:latin typeface="Footlight MT Light" panose="0204060206030A020304" pitchFamily="18" charset="0"/>
+            </a:endParaRPr>
+          </a:p>
+        </p:txBody>
+      </p:sp>
+    </p:spTree>
+    <p:extLst>
+      <p:ext uri="{BB962C8B-B14F-4D97-AF65-F5344CB8AC3E}">
+        <p14:creationId xmlns:p14="http://schemas.microsoft.com/office/powerpoint/2010/main" val="1937285859"/>
+      </p:ext>
+    </p:extLst>
+  </p:cSld>
+  <p:clrMapOvr>
+    <a:masterClrMapping/>
+  </p:clrMapOvr>
+</p:sld>
+</file>
+
+<file path=ppt/slides/slide3.xml><?xml version="1.0" encoding="utf-8"?>
+<p:sld xmlns:a="http://schemas.openxmlformats.org/drawingml/2006/main" xmlns:r="http://schemas.openxmlformats.org/officeDocument/2006/relationships" xmlns:p="http://schemas.openxmlformats.org/presentationml/2006/main">
+  <p:cSld>
+    <p:spTree>
+      <p:nvGrpSpPr>
+        <p:cNvPr id="1" name=""/>
+        <p:cNvGrpSpPr/>
+        <p:nvPr/>
+      </p:nvGrpSpPr>
+      <p:grpSpPr>
+        <a:xfrm>
+          <a:off x="0" y="0"/>
+          <a:ext cx="0" cy="0"/>
+          <a:chOff x="0" y="0"/>
+          <a:chExt cx="0" cy="0"/>
+        </a:xfrm>
+      </p:grpSpPr>
+      <p:sp>
+        <p:nvSpPr>
+          <p:cNvPr id="4" name="Oval 3"/>
+          <p:cNvSpPr/>
+          <p:nvPr/>
+        </p:nvSpPr>
+        <p:spPr>
+          <a:xfrm>
+            <a:off x="603504" y="603504"/>
+            <a:ext cx="4279392" cy="4279392"/>
+          </a:xfrm>
+          <a:prstGeom prst="ellipse">
+            <a:avLst/>
+          </a:prstGeom>
+          <a:solidFill>
+            <a:schemeClr val="bg1">
+              <a:lumMod val="95000"/>
+            </a:schemeClr>
+          </a:solidFill>
+          <a:ln>
+            <a:noFill/>
+          </a:ln>
+          <a:effectLst>
+            <a:outerShdw dist="38100" dir="2700000" algn="tl" rotWithShape="0">
+              <a:prstClr val="black">
+                <a:alpha val="40000"/>
+              </a:prstClr>
+            </a:outerShdw>
+          </a:effectLst>
+          <a:scene3d>
+            <a:camera prst="orthographicFront"/>
+            <a:lightRig rig="harsh" dir="t"/>
+          </a:scene3d>
+          <a:sp3d>
+            <a:bevelT w="152400" h="50800" prst="softRound"/>
+          </a:sp3d>
+        </p:spPr>
+        <p:style>
+          <a:lnRef idx="2">
+            <a:schemeClr val="accent1">
+              <a:shade val="50000"/>
+            </a:schemeClr>
+          </a:lnRef>
+          <a:fillRef idx="1">
+            <a:schemeClr val="accent1"/>
+          </a:fillRef>
+          <a:effectRef idx="0">
+            <a:schemeClr val="accent1"/>
+          </a:effectRef>
+          <a:fontRef idx="minor">
+            <a:schemeClr val="lt1"/>
+          </a:fontRef>
+        </p:style>
+        <p:txBody>
+          <a:bodyPr rtlCol="0" anchor="ctr">
+            <a:sp3d extrusionH="57150" prstMaterial="matte">
+              <a:bevelT w="63500" h="12700" prst="coolSlant"/>
+              <a:contourClr>
+                <a:schemeClr val="bg1">
+                  <a:lumMod val="65000"/>
+                </a:schemeClr>
+              </a:contourClr>
+            </a:sp3d>
+          </a:bodyPr>
+          <a:lstStyle/>
+          <a:p>
+            <a:pPr algn="ctr"/>
+            <a:r>
+              <a:rPr lang="en-US" sz="32400" b="1" dirty="0">
+                <a:ln/>
+                <a:solidFill>
+                  <a:schemeClr val="accent1">
+                    <a:lumMod val="75000"/>
+                  </a:schemeClr>
+                </a:solidFill>
+                <a:latin typeface="Footlight MT Light" panose="0204060206030A020304" pitchFamily="18" charset="0"/>
+              </a:rPr>
+              <a:t>?</a:t>
+            </a:r>
+          </a:p>
+        </p:txBody>
+      </p:sp>
+    </p:spTree>
+    <p:extLst>
+      <p:ext uri="{BB962C8B-B14F-4D97-AF65-F5344CB8AC3E}">
+        <p14:creationId xmlns:p14="http://schemas.microsoft.com/office/powerpoint/2010/main" val="2702230131"/>
       </p:ext>
     </p:extLst>
   </p:cSld>

</xml_diff>